<commit_message>
corrected contact info for data camp
</commit_message>
<xml_diff>
--- a/intropython/Part_3/Python-3.pptx
+++ b/intropython/Part_3/Python-3.pptx
@@ -328,6 +328,11 @@
       </a:defRPr>
     </a:lvl9pPr>
   </p:defaultTextStyle>
+  <p:extLst>
+    <p:ext uri="{EFAFB233-063F-42B5-8137-9DF3F51BA10A}">
+      <p15:sldGuideLst xmlns:p15="http://schemas.microsoft.com/office/powerpoint/2012/main"/>
+    </p:ext>
+  </p:extLst>
 </p:presentation>
 </file>
 
@@ -8888,8 +8893,14 @@
           <a:lstStyle/>
           <a:p>
             <a:r>
-              <a:t>Data Camp email:</a:t>
-            </a:r>
+              <a:rPr dirty="0"/>
+              <a:t>Data </a:t>
+            </a:r>
+            <a:r>
+              <a:rPr dirty="0" smtClean="0"/>
+              <a:t>Camp:</a:t>
+            </a:r>
+            <a:endParaRPr dirty="0"/>
           </a:p>
         </p:txBody>
       </p:sp>
@@ -8913,7 +8924,9 @@
           </a:prstGeom>
         </p:spPr>
         <p:txBody>
-          <a:bodyPr/>
+          <a:bodyPr>
+            <a:normAutofit fontScale="77500" lnSpcReduction="20000"/>
+          </a:bodyPr>
           <a:lstStyle>
             <a:lvl1pPr>
               <a:defRPr sz="5300" u="sng">
@@ -8926,11 +8939,24 @@
               <a:defRPr u="none"/>
             </a:pPr>
             <a:r>
-              <a:rPr u="sng">
-                <a:hlinkClick r:id="rId2"/>
-              </a:rPr>
-              <a:t>quest-help@northwestern.edu</a:t>
-            </a:r>
+              <a:rPr lang="en-US" dirty="0"/>
+              <a:t>http://</a:t>
+            </a:r>
+            <a:r>
+              <a:rPr lang="en-US" dirty="0" err="1"/>
+              <a:t>www.it.northwestern.edu</a:t>
+            </a:r>
+            <a:r>
+              <a:rPr lang="en-US" dirty="0"/>
+              <a:t>/research/campus-events/data-</a:t>
+            </a:r>
+            <a:r>
+              <a:rPr lang="en-US" dirty="0" err="1"/>
+              <a:t>camp.html</a:t>
+            </a:r>
+            <a:endParaRPr u="sng" dirty="0">
+              <a:hlinkClick r:id="rId2"/>
+            </a:endParaRPr>
           </a:p>
         </p:txBody>
       </p:sp>

</xml_diff>